<commit_message>
minor fixes for MS PowerPoint
</commit_message>
<xml_diff>
--- a/lib/pptx/template.pptx
+++ b/lib/pptx/template.pptx
@@ -180,7 +180,7 @@
           <a:p>
             <a:fld id="{5BCAD085-E8A6-8845-BD4E-CB4CCA059FC4}" type="datetimeFigureOut">
               <a:rPr lang="en-US" smtClean="0"/>
-              <a:t>1/27/13</a:t>
+              <a:t>4/5/2023</a:t>
             </a:fld>
             <a:endParaRPr lang="en-US"/>
           </a:p>
@@ -222,7 +222,7 @@
           <a:p>
             <a:fld id="{C1FF6DA9-008F-8B48-92A6-B652298478BF}" type="slidenum">
               <a:rPr lang="en-US" smtClean="0"/>
-              <a:t>‹#›</a:t>
+              <a:t>‹nº›</a:t>
             </a:fld>
             <a:endParaRPr lang="en-US"/>
           </a:p>
@@ -350,7 +350,7 @@
           <a:p>
             <a:fld id="{5BCAD085-E8A6-8845-BD4E-CB4CCA059FC4}" type="datetimeFigureOut">
               <a:rPr lang="en-US" smtClean="0"/>
-              <a:t>1/27/13</a:t>
+              <a:t>4/5/2023</a:t>
             </a:fld>
             <a:endParaRPr lang="en-US"/>
           </a:p>
@@ -392,7 +392,7 @@
           <a:p>
             <a:fld id="{C1FF6DA9-008F-8B48-92A6-B652298478BF}" type="slidenum">
               <a:rPr lang="en-US" smtClean="0"/>
-              <a:t>‹#›</a:t>
+              <a:t>‹nº›</a:t>
             </a:fld>
             <a:endParaRPr lang="en-US"/>
           </a:p>
@@ -530,7 +530,7 @@
           <a:p>
             <a:fld id="{5BCAD085-E8A6-8845-BD4E-CB4CCA059FC4}" type="datetimeFigureOut">
               <a:rPr lang="en-US" smtClean="0"/>
-              <a:t>1/27/13</a:t>
+              <a:t>4/5/2023</a:t>
             </a:fld>
             <a:endParaRPr lang="en-US"/>
           </a:p>
@@ -572,7 +572,7 @@
           <a:p>
             <a:fld id="{C1FF6DA9-008F-8B48-92A6-B652298478BF}" type="slidenum">
               <a:rPr lang="en-US" smtClean="0"/>
-              <a:t>‹#›</a:t>
+              <a:t>‹nº›</a:t>
             </a:fld>
             <a:endParaRPr lang="en-US"/>
           </a:p>
@@ -700,7 +700,7 @@
           <a:p>
             <a:fld id="{5BCAD085-E8A6-8845-BD4E-CB4CCA059FC4}" type="datetimeFigureOut">
               <a:rPr lang="en-US" smtClean="0"/>
-              <a:t>1/27/13</a:t>
+              <a:t>4/5/2023</a:t>
             </a:fld>
             <a:endParaRPr lang="en-US"/>
           </a:p>
@@ -742,7 +742,7 @@
           <a:p>
             <a:fld id="{C1FF6DA9-008F-8B48-92A6-B652298478BF}" type="slidenum">
               <a:rPr lang="en-US" smtClean="0"/>
-              <a:t>‹#›</a:t>
+              <a:t>‹nº›</a:t>
             </a:fld>
             <a:endParaRPr lang="en-US"/>
           </a:p>
@@ -946,7 +946,7 @@
           <a:p>
             <a:fld id="{5BCAD085-E8A6-8845-BD4E-CB4CCA059FC4}" type="datetimeFigureOut">
               <a:rPr lang="en-US" smtClean="0"/>
-              <a:t>1/27/13</a:t>
+              <a:t>4/5/2023</a:t>
             </a:fld>
             <a:endParaRPr lang="en-US"/>
           </a:p>
@@ -988,7 +988,7 @@
           <a:p>
             <a:fld id="{C1FF6DA9-008F-8B48-92A6-B652298478BF}" type="slidenum">
               <a:rPr lang="en-US" smtClean="0"/>
-              <a:t>‹#›</a:t>
+              <a:t>‹nº›</a:t>
             </a:fld>
             <a:endParaRPr lang="en-US"/>
           </a:p>
@@ -1234,7 +1234,7 @@
           <a:p>
             <a:fld id="{5BCAD085-E8A6-8845-BD4E-CB4CCA059FC4}" type="datetimeFigureOut">
               <a:rPr lang="en-US" smtClean="0"/>
-              <a:t>1/27/13</a:t>
+              <a:t>4/5/2023</a:t>
             </a:fld>
             <a:endParaRPr lang="en-US"/>
           </a:p>
@@ -1276,7 +1276,7 @@
           <a:p>
             <a:fld id="{C1FF6DA9-008F-8B48-92A6-B652298478BF}" type="slidenum">
               <a:rPr lang="en-US" smtClean="0"/>
-              <a:t>‹#›</a:t>
+              <a:t>‹nº›</a:t>
             </a:fld>
             <a:endParaRPr lang="en-US"/>
           </a:p>
@@ -1656,7 +1656,7 @@
           <a:p>
             <a:fld id="{5BCAD085-E8A6-8845-BD4E-CB4CCA059FC4}" type="datetimeFigureOut">
               <a:rPr lang="en-US" smtClean="0"/>
-              <a:t>1/27/13</a:t>
+              <a:t>4/5/2023</a:t>
             </a:fld>
             <a:endParaRPr lang="en-US"/>
           </a:p>
@@ -1698,7 +1698,7 @@
           <a:p>
             <a:fld id="{C1FF6DA9-008F-8B48-92A6-B652298478BF}" type="slidenum">
               <a:rPr lang="en-US" smtClean="0"/>
-              <a:t>‹#›</a:t>
+              <a:t>‹nº›</a:t>
             </a:fld>
             <a:endParaRPr lang="en-US"/>
           </a:p>
@@ -1774,7 +1774,7 @@
           <a:p>
             <a:fld id="{5BCAD085-E8A6-8845-BD4E-CB4CCA059FC4}" type="datetimeFigureOut">
               <a:rPr lang="en-US" smtClean="0"/>
-              <a:t>1/27/13</a:t>
+              <a:t>4/5/2023</a:t>
             </a:fld>
             <a:endParaRPr lang="en-US"/>
           </a:p>
@@ -1816,7 +1816,7 @@
           <a:p>
             <a:fld id="{C1FF6DA9-008F-8B48-92A6-B652298478BF}" type="slidenum">
               <a:rPr lang="en-US" smtClean="0"/>
-              <a:t>‹#›</a:t>
+              <a:t>‹nº›</a:t>
             </a:fld>
             <a:endParaRPr lang="en-US"/>
           </a:p>
@@ -1869,7 +1869,7 @@
           <a:p>
             <a:fld id="{5BCAD085-E8A6-8845-BD4E-CB4CCA059FC4}" type="datetimeFigureOut">
               <a:rPr lang="en-US" smtClean="0"/>
-              <a:t>1/27/13</a:t>
+              <a:t>4/5/2023</a:t>
             </a:fld>
             <a:endParaRPr lang="en-US"/>
           </a:p>
@@ -1911,7 +1911,7 @@
           <a:p>
             <a:fld id="{C1FF6DA9-008F-8B48-92A6-B652298478BF}" type="slidenum">
               <a:rPr lang="en-US" smtClean="0"/>
-              <a:t>‹#›</a:t>
+              <a:t>‹nº›</a:t>
             </a:fld>
             <a:endParaRPr lang="en-US"/>
           </a:p>
@@ -2146,7 +2146,7 @@
           <a:p>
             <a:fld id="{5BCAD085-E8A6-8845-BD4E-CB4CCA059FC4}" type="datetimeFigureOut">
               <a:rPr lang="en-US" smtClean="0"/>
-              <a:t>1/27/13</a:t>
+              <a:t>4/5/2023</a:t>
             </a:fld>
             <a:endParaRPr lang="en-US"/>
           </a:p>
@@ -2188,7 +2188,7 @@
           <a:p>
             <a:fld id="{C1FF6DA9-008F-8B48-92A6-B652298478BF}" type="slidenum">
               <a:rPr lang="en-US" smtClean="0"/>
-              <a:t>‹#›</a:t>
+              <a:t>‹nº›</a:t>
             </a:fld>
             <a:endParaRPr lang="en-US"/>
           </a:p>
@@ -2399,7 +2399,7 @@
           <a:p>
             <a:fld id="{5BCAD085-E8A6-8845-BD4E-CB4CCA059FC4}" type="datetimeFigureOut">
               <a:rPr lang="en-US" smtClean="0"/>
-              <a:t>1/27/13</a:t>
+              <a:t>4/5/2023</a:t>
             </a:fld>
             <a:endParaRPr lang="en-US"/>
           </a:p>
@@ -2441,7 +2441,7 @@
           <a:p>
             <a:fld id="{C1FF6DA9-008F-8B48-92A6-B652298478BF}" type="slidenum">
               <a:rPr lang="en-US" smtClean="0"/>
-              <a:t>‹#›</a:t>
+              <a:t>‹nº›</a:t>
             </a:fld>
             <a:endParaRPr lang="en-US"/>
           </a:p>
@@ -2612,7 +2612,7 @@
           <a:p>
             <a:fld id="{5BCAD085-E8A6-8845-BD4E-CB4CCA059FC4}" type="datetimeFigureOut">
               <a:rPr lang="en-US" smtClean="0"/>
-              <a:t>1/27/13</a:t>
+              <a:t>4/5/2023</a:t>
             </a:fld>
             <a:endParaRPr lang="en-US"/>
           </a:p>
@@ -2690,7 +2690,7 @@
           <a:p>
             <a:fld id="{C1FF6DA9-008F-8B48-92A6-B652298478BF}" type="slidenum">
               <a:rPr lang="en-US" smtClean="0"/>
-              <a:t>‹#›</a:t>
+              <a:t>‹nº›</a:t>
             </a:fld>
             <a:endParaRPr lang="en-US"/>
           </a:p>

</xml_diff>